<commit_message>
update checklist and slide
</commit_message>
<xml_diff>
--- a/presentations/Log analyze.pptx
+++ b/presentations/Log analyze.pptx
@@ -5,19 +5,21 @@
     <p:sldMasterId id="2147483648" r:id="rId1"/>
   </p:sldMasterIdLst>
   <p:notesMasterIdLst>
-    <p:notesMasterId r:id="rId10"/>
+    <p:notesMasterId r:id="rId12"/>
   </p:notesMasterIdLst>
   <p:handoutMasterIdLst>
-    <p:handoutMasterId r:id="rId11"/>
+    <p:handoutMasterId r:id="rId13"/>
   </p:handoutMasterIdLst>
   <p:sldIdLst>
     <p:sldId id="360" r:id="rId3"/>
-    <p:sldId id="361" r:id="rId4"/>
-    <p:sldId id="362" r:id="rId5"/>
-    <p:sldId id="363" r:id="rId6"/>
-    <p:sldId id="364" r:id="rId7"/>
-    <p:sldId id="365" r:id="rId8"/>
-    <p:sldId id="367" r:id="rId9"/>
+    <p:sldId id="369" r:id="rId4"/>
+    <p:sldId id="371" r:id="rId5"/>
+    <p:sldId id="372" r:id="rId6"/>
+    <p:sldId id="362" r:id="rId7"/>
+    <p:sldId id="363" r:id="rId8"/>
+    <p:sldId id="364" r:id="rId9"/>
+    <p:sldId id="365" r:id="rId10"/>
+    <p:sldId id="367" r:id="rId11"/>
   </p:sldIdLst>
   <p:sldSz cx="12192000" cy="6858000"/>
   <p:notesSz cx="6858000" cy="9144000"/>
@@ -1834,18 +1836,18 @@
       </p:sp>
       <p:sp>
         <p:nvSpPr>
-          <p:cNvPr id="15" name="Text Placeholder 14"/>
-          <p:cNvSpPr>
-            <a:spLocks noGrp="1"/>
-          </p:cNvSpPr>
-          <p:nvPr>
-            <p:ph type="body" sz="quarter" idx="4294967295"/>
+          <p:cNvPr id="15" name="Content Placeholder 14"/>
+          <p:cNvSpPr>
+            <a:spLocks noGrp="1"/>
+          </p:cNvSpPr>
+          <p:nvPr>
+            <p:ph sz="quarter" idx="11"/>
           </p:nvPr>
         </p:nvSpPr>
         <p:spPr>
           <a:xfrm>
-            <a:off x="295275" y="1877695"/>
-            <a:ext cx="10515600" cy="4346575"/>
+            <a:off x="441960" y="1770380"/>
+            <a:ext cx="6678295" cy="2193925"/>
           </a:xfrm>
         </p:spPr>
         <p:txBody>
@@ -1859,7 +1861,7 @@
               <a:buChar char="§"/>
             </a:pPr>
             <a:r>
-              <a:rPr lang="en-US" altLang="x-none" dirty="0" err="1">
+              <a:rPr lang="en-US" altLang="x-none" sz="2800" dirty="0" err="1">
                 <a:solidFill>
                   <a:schemeClr val="bg2">
                     <a:lumMod val="25000"/>
@@ -1870,7 +1872,7 @@
               </a:rPr>
               <a:t>Production monitoring and debugging</a:t>
             </a:r>
-            <a:endParaRPr lang="en-US" altLang="x-none" dirty="0" err="1">
+            <a:endParaRPr lang="en-US" altLang="x-none" sz="2800" dirty="0" err="1">
               <a:solidFill>
                 <a:schemeClr val="bg2">
                   <a:lumMod val="25000"/>
@@ -1889,7 +1891,7 @@
               <a:buChar char="§"/>
             </a:pPr>
             <a:r>
-              <a:rPr lang="en-US" altLang="x-none" dirty="0" err="1">
+              <a:rPr lang="en-US" altLang="x-none" sz="2800" dirty="0" err="1">
                 <a:solidFill>
                   <a:schemeClr val="bg2">
                     <a:lumMod val="25000"/>
@@ -1900,7 +1902,7 @@
               </a:rPr>
               <a:t>Resource usage</a:t>
             </a:r>
-            <a:endParaRPr lang="en-US" altLang="x-none" dirty="0" err="1">
+            <a:endParaRPr lang="en-US" altLang="x-none" sz="2800" dirty="0" err="1">
               <a:solidFill>
                 <a:schemeClr val="bg2">
                   <a:lumMod val="25000"/>
@@ -1910,120 +1912,34 @@
               <a:sym typeface="+mn-ea"/>
             </a:endParaRPr>
           </a:p>
-          <a:p>
-            <a:pPr marL="285750" indent="-285750" algn="l">
-              <a:lnSpc>
-                <a:spcPct val="140000"/>
-              </a:lnSpc>
-              <a:buFont typeface="Wingdings" panose="05000000000000000000" charset="0"/>
-              <a:buChar char="§"/>
-            </a:pPr>
-            <a:r>
-              <a:rPr lang="en-US" altLang="x-none" dirty="0" err="1">
-                <a:solidFill>
-                  <a:schemeClr val="bg2">
-                    <a:lumMod val="25000"/>
-                  </a:schemeClr>
-                </a:solidFill>
-                <a:latin typeface="Arial" panose="020B0604020202020204" pitchFamily="34" charset="0"/>
-                <a:sym typeface="+mn-ea"/>
-              </a:rPr>
-              <a:t>Tracking client requests</a:t>
-            </a:r>
-            <a:endParaRPr lang="en-US" altLang="x-none" dirty="0" err="1">
-              <a:solidFill>
-                <a:schemeClr val="bg2">
-                  <a:lumMod val="25000"/>
-                </a:schemeClr>
-              </a:solidFill>
-              <a:latin typeface="Arial" panose="020B0604020202020204" pitchFamily="34" charset="0"/>
-              <a:sym typeface="+mn-ea"/>
-            </a:endParaRPr>
-          </a:p>
-          <a:p>
-            <a:pPr marL="285750" indent="-285750" algn="l">
-              <a:lnSpc>
-                <a:spcPct val="140000"/>
-              </a:lnSpc>
-              <a:buFont typeface="Wingdings" panose="05000000000000000000" charset="0"/>
-              <a:buChar char="§"/>
-            </a:pPr>
-            <a:r>
-              <a:rPr lang="en-US" altLang="x-none" dirty="0" err="1">
-                <a:solidFill>
-                  <a:schemeClr val="bg2">
-                    <a:lumMod val="25000"/>
-                  </a:schemeClr>
-                </a:solidFill>
-                <a:latin typeface="Arial" panose="020B0604020202020204" pitchFamily="34" charset="0"/>
-                <a:sym typeface="+mn-ea"/>
-              </a:rPr>
-              <a:t>Performance analysis</a:t>
-            </a:r>
-            <a:endParaRPr lang="en-US" altLang="x-none" dirty="0" err="1">
-              <a:solidFill>
-                <a:schemeClr val="bg2">
-                  <a:lumMod val="25000"/>
-                </a:schemeClr>
-              </a:solidFill>
-              <a:latin typeface="Arial" panose="020B0604020202020204" pitchFamily="34" charset="0"/>
-              <a:sym typeface="+mn-ea"/>
-            </a:endParaRPr>
-          </a:p>
-          <a:p>
-            <a:pPr marL="285750" indent="-285750" algn="l">
-              <a:lnSpc>
-                <a:spcPct val="140000"/>
-              </a:lnSpc>
-              <a:buFont typeface="Wingdings" panose="05000000000000000000" charset="0"/>
-              <a:buChar char="§"/>
-            </a:pPr>
-            <a:r>
-              <a:rPr lang="en-US" altLang="x-none" dirty="0" err="1">
-                <a:solidFill>
-                  <a:schemeClr val="bg2">
-                    <a:lumMod val="25000"/>
-                  </a:schemeClr>
-                </a:solidFill>
-                <a:latin typeface="Arial" panose="020B0604020202020204" pitchFamily="34" charset="0"/>
-                <a:sym typeface="+mn-ea"/>
-              </a:rPr>
-              <a:t>Identifying key trends</a:t>
-            </a:r>
-            <a:endParaRPr lang="en-US" altLang="x-none" dirty="0" err="1">
-              <a:solidFill>
-                <a:schemeClr val="bg2">
-                  <a:lumMod val="25000"/>
-                </a:schemeClr>
-              </a:solidFill>
-              <a:latin typeface="Arial" panose="020B0604020202020204" pitchFamily="34" charset="0"/>
-              <a:sym typeface="+mn-ea"/>
-            </a:endParaRPr>
-          </a:p>
-          <a:p>
-            <a:pPr marL="285750" indent="-285750" algn="l">
-              <a:lnSpc>
-                <a:spcPct val="140000"/>
-              </a:lnSpc>
-              <a:buFont typeface="Wingdings" panose="05000000000000000000" charset="0"/>
-              <a:buChar char="§"/>
-            </a:pPr>
-            <a:r>
-              <a:rPr lang="en-US" altLang="x-none" i="1" dirty="0" err="1">
-                <a:solidFill>
-                  <a:schemeClr val="bg2">
-                    <a:lumMod val="25000"/>
-                  </a:schemeClr>
-                </a:solidFill>
-                <a:latin typeface="Arial" panose="020B0604020202020204" pitchFamily="34" charset="0"/>
-                <a:sym typeface="+mn-ea"/>
-              </a:rPr>
-              <a:t>...</a:t>
-            </a:r>
-            <a:endParaRPr lang="en-US"/>
-          </a:p>
-        </p:txBody>
-      </p:sp>
+        </p:txBody>
+      </p:sp>
+      <p:pic>
+        <p:nvPicPr>
+          <p:cNvPr id="4" name="Picture Placeholder 3" descr="original"/>
+          <p:cNvPicPr>
+            <a:picLocks noChangeAspect="1"/>
+          </p:cNvPicPr>
+          <p:nvPr>
+            <p:ph type="pic" sz="quarter" idx="12"/>
+          </p:nvPr>
+        </p:nvPicPr>
+        <p:blipFill>
+          <a:blip r:embed="rId1"/>
+          <a:stretch>
+            <a:fillRect/>
+          </a:stretch>
+        </p:blipFill>
+        <p:spPr>
+          <a:xfrm>
+            <a:off x="4897755" y="2876550"/>
+            <a:ext cx="7010400" cy="3295650"/>
+          </a:xfrm>
+          <a:prstGeom prst="rect">
+            <a:avLst/>
+          </a:prstGeom>
+        </p:spPr>
+      </p:pic>
     </p:spTree>
   </p:cSld>
   <p:clrMapOvr>
@@ -2044,6 +1960,236 @@
       <p:grpSpPr/>
       <p:sp>
         <p:nvSpPr>
+          <p:cNvPr id="2" name="Title 1"/>
+          <p:cNvSpPr>
+            <a:spLocks noGrp="1"/>
+          </p:cNvSpPr>
+          <p:nvPr>
+            <p:ph type="ctrTitle"/>
+          </p:nvPr>
+        </p:nvSpPr>
+        <p:spPr/>
+        <p:txBody>
+          <a:bodyPr/>
+          <a:p>
+            <a:r>
+              <a:rPr lang="en-US"/>
+              <a:t>Benefits</a:t>
+            </a:r>
+            <a:endParaRPr lang="en-US"/>
+          </a:p>
+        </p:txBody>
+      </p:sp>
+      <p:sp>
+        <p:nvSpPr>
+          <p:cNvPr id="15" name="Content Placeholder 14"/>
+          <p:cNvSpPr>
+            <a:spLocks noGrp="1"/>
+          </p:cNvSpPr>
+          <p:nvPr>
+            <p:ph sz="quarter" idx="11"/>
+          </p:nvPr>
+        </p:nvSpPr>
+        <p:spPr>
+          <a:xfrm>
+            <a:off x="441960" y="1770380"/>
+            <a:ext cx="6678295" cy="2193925"/>
+          </a:xfrm>
+        </p:spPr>
+        <p:txBody>
+          <a:bodyPr/>
+          <a:p>
+            <a:pPr marL="285750" indent="-285750" algn="l">
+              <a:lnSpc>
+                <a:spcPct val="140000"/>
+              </a:lnSpc>
+              <a:buFont typeface="Wingdings" panose="05000000000000000000" charset="0"/>
+              <a:buChar char="§"/>
+            </a:pPr>
+            <a:r>
+              <a:rPr lang="en-US" altLang="x-none" sz="2800" dirty="0" err="1">
+                <a:solidFill>
+                  <a:schemeClr val="bg2">
+                    <a:lumMod val="25000"/>
+                  </a:schemeClr>
+                </a:solidFill>
+                <a:latin typeface="Arial" panose="020B0604020202020204" pitchFamily="34" charset="0"/>
+                <a:sym typeface="+mn-ea"/>
+              </a:rPr>
+              <a:t>Performance analysis</a:t>
+            </a:r>
+            <a:endParaRPr lang="en-US" altLang="x-none" sz="2800" dirty="0" err="1">
+              <a:solidFill>
+                <a:schemeClr val="bg2">
+                  <a:lumMod val="25000"/>
+                </a:schemeClr>
+              </a:solidFill>
+              <a:latin typeface="Arial" panose="020B0604020202020204" pitchFamily="34" charset="0"/>
+              <a:sym typeface="+mn-ea"/>
+            </a:endParaRPr>
+          </a:p>
+        </p:txBody>
+      </p:sp>
+      <p:sp>
+        <p:nvSpPr>
+          <p:cNvPr id="3" name="Picture Placeholder 2"/>
+          <p:cNvSpPr/>
+          <p:nvPr>
+            <p:ph type="pic" sz="quarter" idx="12"/>
+          </p:nvPr>
+        </p:nvSpPr>
+        <p:spPr/>
+      </p:sp>
+    </p:spTree>
+  </p:cSld>
+  <p:clrMapOvr>
+    <a:masterClrMapping/>
+  </p:clrMapOvr>
+</p:sld>
+</file>
+
+<file path=ppt/slides/slide4.xml><?xml version="1.0" encoding="utf-8"?>
+<p:sld xmlns:a="http://schemas.openxmlformats.org/drawingml/2006/main" xmlns:r="http://schemas.openxmlformats.org/officeDocument/2006/relationships" xmlns:p="http://schemas.openxmlformats.org/presentationml/2006/main">
+  <p:cSld>
+    <p:spTree>
+      <p:nvGrpSpPr>
+        <p:cNvPr id="1" name=""/>
+        <p:cNvGrpSpPr/>
+        <p:nvPr/>
+      </p:nvGrpSpPr>
+      <p:grpSpPr/>
+      <p:sp>
+        <p:nvSpPr>
+          <p:cNvPr id="2" name="Title 1"/>
+          <p:cNvSpPr>
+            <a:spLocks noGrp="1"/>
+          </p:cNvSpPr>
+          <p:nvPr>
+            <p:ph type="ctrTitle"/>
+          </p:nvPr>
+        </p:nvSpPr>
+        <p:spPr/>
+        <p:txBody>
+          <a:bodyPr/>
+          <a:p>
+            <a:r>
+              <a:rPr lang="en-US"/>
+              <a:t>Benefits</a:t>
+            </a:r>
+            <a:endParaRPr lang="en-US"/>
+          </a:p>
+        </p:txBody>
+      </p:sp>
+      <p:sp>
+        <p:nvSpPr>
+          <p:cNvPr id="15" name="Content Placeholder 14"/>
+          <p:cNvSpPr>
+            <a:spLocks noGrp="1"/>
+          </p:cNvSpPr>
+          <p:nvPr>
+            <p:ph sz="quarter" idx="11"/>
+          </p:nvPr>
+        </p:nvSpPr>
+        <p:spPr>
+          <a:xfrm>
+            <a:off x="441960" y="1770380"/>
+            <a:ext cx="6678295" cy="2193925"/>
+          </a:xfrm>
+        </p:spPr>
+        <p:txBody>
+          <a:bodyPr/>
+          <a:p>
+            <a:pPr marL="285750" indent="-285750" algn="l">
+              <a:lnSpc>
+                <a:spcPct val="140000"/>
+              </a:lnSpc>
+              <a:buFont typeface="Wingdings" panose="05000000000000000000" charset="0"/>
+              <a:buChar char="§"/>
+            </a:pPr>
+            <a:r>
+              <a:rPr lang="en-US" altLang="x-none" sz="2800" dirty="0" err="1">
+                <a:solidFill>
+                  <a:schemeClr val="bg2">
+                    <a:lumMod val="25000"/>
+                  </a:schemeClr>
+                </a:solidFill>
+                <a:latin typeface="Arial" panose="020B0604020202020204" pitchFamily="34" charset="0"/>
+                <a:sym typeface="+mn-ea"/>
+              </a:rPr>
+              <a:t>Tracking client requests</a:t>
+            </a:r>
+            <a:endParaRPr lang="en-US" altLang="x-none" sz="2800" dirty="0" err="1">
+              <a:solidFill>
+                <a:schemeClr val="bg2">
+                  <a:lumMod val="25000"/>
+                </a:schemeClr>
+              </a:solidFill>
+              <a:latin typeface="Arial" panose="020B0604020202020204" pitchFamily="34" charset="0"/>
+              <a:sym typeface="+mn-ea"/>
+            </a:endParaRPr>
+          </a:p>
+          <a:p>
+            <a:pPr marL="285750" indent="-285750" algn="l">
+              <a:lnSpc>
+                <a:spcPct val="140000"/>
+              </a:lnSpc>
+              <a:buFont typeface="Wingdings" panose="05000000000000000000" charset="0"/>
+              <a:buChar char="§"/>
+            </a:pPr>
+            <a:r>
+              <a:rPr lang="en-US" altLang="x-none" sz="2800" dirty="0" err="1">
+                <a:solidFill>
+                  <a:schemeClr val="bg2">
+                    <a:lumMod val="25000"/>
+                  </a:schemeClr>
+                </a:solidFill>
+                <a:latin typeface="Arial" panose="020B0604020202020204" pitchFamily="34" charset="0"/>
+                <a:sym typeface="+mn-ea"/>
+              </a:rPr>
+              <a:t>Identifying key trends</a:t>
+            </a:r>
+            <a:endParaRPr lang="en-US" altLang="x-none" sz="2800" dirty="0" err="1">
+              <a:solidFill>
+                <a:schemeClr val="bg2">
+                  <a:lumMod val="25000"/>
+                </a:schemeClr>
+              </a:solidFill>
+              <a:latin typeface="Arial" panose="020B0604020202020204" pitchFamily="34" charset="0"/>
+              <a:sym typeface="+mn-ea"/>
+            </a:endParaRPr>
+          </a:p>
+        </p:txBody>
+      </p:sp>
+      <p:sp>
+        <p:nvSpPr>
+          <p:cNvPr id="3" name="Picture Placeholder 2"/>
+          <p:cNvSpPr/>
+          <p:nvPr>
+            <p:ph type="pic" sz="quarter" idx="12"/>
+          </p:nvPr>
+        </p:nvSpPr>
+        <p:spPr/>
+      </p:sp>
+    </p:spTree>
+  </p:cSld>
+  <p:clrMapOvr>
+    <a:masterClrMapping/>
+  </p:clrMapOvr>
+</p:sld>
+</file>
+
+<file path=ppt/slides/slide5.xml><?xml version="1.0" encoding="utf-8"?>
+<p:sld xmlns:a="http://schemas.openxmlformats.org/drawingml/2006/main" xmlns:r="http://schemas.openxmlformats.org/officeDocument/2006/relationships" xmlns:p="http://schemas.openxmlformats.org/presentationml/2006/main">
+  <p:cSld>
+    <p:spTree>
+      <p:nvGrpSpPr>
+        <p:cNvPr id="1" name=""/>
+        <p:cNvGrpSpPr/>
+        <p:nvPr/>
+      </p:nvGrpSpPr>
+      <p:grpSpPr/>
+      <p:sp>
+        <p:nvSpPr>
           <p:cNvPr id="16" name="Title 15"/>
           <p:cNvSpPr>
             <a:spLocks noGrp="1"/>
@@ -2067,12 +2213,14 @@
       <p:graphicFrame>
         <p:nvGraphicFramePr>
           <p:cNvPr id="13" name="Object 12"/>
-          <p:cNvGraphicFramePr/>
+          <p:cNvGraphicFramePr>
+            <a:graphicFrameLocks noChangeAspect="1"/>
+          </p:cNvGraphicFramePr>
           <p:nvPr/>
         </p:nvGraphicFramePr>
         <p:xfrm>
-          <a:off x="1428750" y="2122805"/>
-          <a:ext cx="9658440" cy="3029040"/>
+          <a:off x="1266825" y="2153285"/>
+          <a:ext cx="9175519" cy="2877588"/>
         </p:xfrm>
         <a:graphic>
           <a:graphicData uri="http://schemas.openxmlformats.org/presentationml/2006/ole">
@@ -2099,8 +2247,8 @@
                     </p:blipFill>
                     <p:spPr>
                       <a:xfrm>
-                        <a:off x="1428750" y="2122805"/>
-                        <a:ext cx="9658440" cy="3029040"/>
+                        <a:off x="1266825" y="2153285"/>
+                        <a:ext cx="9175519" cy="2877588"/>
                       </a:xfrm>
                       <a:prstGeom prst="rect">
                         <a:avLst/>
@@ -2121,147 +2269,6 @@
 </p:sld>
 </file>
 
-<file path=ppt/slides/slide4.xml><?xml version="1.0" encoding="utf-8"?>
-<p:sld xmlns:a="http://schemas.openxmlformats.org/drawingml/2006/main" xmlns:r="http://schemas.openxmlformats.org/officeDocument/2006/relationships" xmlns:p="http://schemas.openxmlformats.org/presentationml/2006/main">
-  <p:cSld>
-    <p:spTree>
-      <p:nvGrpSpPr>
-        <p:cNvPr id="1" name=""/>
-        <p:cNvGrpSpPr/>
-        <p:nvPr/>
-      </p:nvGrpSpPr>
-      <p:grpSpPr/>
-      <p:sp>
-        <p:nvSpPr>
-          <p:cNvPr id="10" name="Title 9"/>
-          <p:cNvSpPr>
-            <a:spLocks noGrp="1"/>
-          </p:cNvSpPr>
-          <p:nvPr>
-            <p:ph type="ctrTitle"/>
-          </p:nvPr>
-        </p:nvSpPr>
-        <p:spPr/>
-        <p:txBody>
-          <a:bodyPr/>
-          <a:p>
-            <a:r>
-              <a:rPr lang="en-US"/>
-              <a:t>Logstash</a:t>
-            </a:r>
-            <a:endParaRPr lang="en-US"/>
-          </a:p>
-        </p:txBody>
-      </p:sp>
-      <p:sp>
-        <p:nvSpPr>
-          <p:cNvPr id="11" name="Content Placeholder 10"/>
-          <p:cNvSpPr>
-            <a:spLocks noGrp="1"/>
-          </p:cNvSpPr>
-          <p:nvPr>
-            <p:ph sz="quarter" idx="11"/>
-          </p:nvPr>
-        </p:nvSpPr>
-        <p:spPr>
-          <a:xfrm>
-            <a:off x="838200" y="1776730"/>
-            <a:ext cx="5860415" cy="4395470"/>
-          </a:xfrm>
-        </p:spPr>
-        <p:txBody>
-          <a:bodyPr/>
-          <a:p>
-            <a:r>
-              <a:rPr lang="en-US" sz="2800"/>
-              <a:t>Parse log line into readable format</a:t>
-            </a:r>
-            <a:endParaRPr lang="en-US" sz="2800"/>
-          </a:p>
-        </p:txBody>
-      </p:sp>
-    </p:spTree>
-  </p:cSld>
-  <p:clrMapOvr>
-    <a:masterClrMapping/>
-  </p:clrMapOvr>
-</p:sld>
-</file>
-
-<file path=ppt/slides/slide5.xml><?xml version="1.0" encoding="utf-8"?>
-<p:sld xmlns:a="http://schemas.openxmlformats.org/drawingml/2006/main" xmlns:r="http://schemas.openxmlformats.org/officeDocument/2006/relationships" xmlns:p="http://schemas.openxmlformats.org/presentationml/2006/main">
-  <p:cSld>
-    <p:spTree>
-      <p:nvGrpSpPr>
-        <p:cNvPr id="1" name=""/>
-        <p:cNvGrpSpPr/>
-        <p:nvPr/>
-      </p:nvGrpSpPr>
-      <p:grpSpPr/>
-      <p:sp>
-        <p:nvSpPr>
-          <p:cNvPr id="10" name="Title 9"/>
-          <p:cNvSpPr>
-            <a:spLocks noGrp="1"/>
-          </p:cNvSpPr>
-          <p:nvPr>
-            <p:ph type="ctrTitle"/>
-          </p:nvPr>
-        </p:nvSpPr>
-        <p:spPr/>
-        <p:txBody>
-          <a:bodyPr/>
-          <a:p>
-            <a:r>
-              <a:rPr lang="en-US"/>
-              <a:t>Elasticsearch</a:t>
-            </a:r>
-            <a:endParaRPr lang="en-US"/>
-          </a:p>
-        </p:txBody>
-      </p:sp>
-      <p:sp>
-        <p:nvSpPr>
-          <p:cNvPr id="11" name="Content Placeholder 10"/>
-          <p:cNvSpPr>
-            <a:spLocks noGrp="1"/>
-          </p:cNvSpPr>
-          <p:nvPr>
-            <p:ph sz="quarter" idx="11"/>
-          </p:nvPr>
-        </p:nvSpPr>
-        <p:spPr>
-          <a:xfrm>
-            <a:off x="838200" y="1776730"/>
-            <a:ext cx="5860415" cy="4395470"/>
-          </a:xfrm>
-        </p:spPr>
-        <p:txBody>
-          <a:bodyPr/>
-          <a:p>
-            <a:r>
-              <a:rPr lang="en-US" sz="2800"/>
-              <a:t>Store log data</a:t>
-            </a:r>
-            <a:endParaRPr lang="en-US" sz="2800"/>
-          </a:p>
-          <a:p>
-            <a:r>
-              <a:rPr lang="en-US" sz="2800"/>
-              <a:t>Act as datasource for Kibana</a:t>
-            </a:r>
-            <a:endParaRPr lang="en-US" sz="2800"/>
-          </a:p>
-        </p:txBody>
-      </p:sp>
-    </p:spTree>
-  </p:cSld>
-  <p:clrMapOvr>
-    <a:masterClrMapping/>
-  </p:clrMapOvr>
-</p:sld>
-</file>
-
 <file path=ppt/slides/slide6.xml><?xml version="1.0" encoding="utf-8"?>
 <p:sld xmlns:a="http://schemas.openxmlformats.org/drawingml/2006/main" xmlns:r="http://schemas.openxmlformats.org/officeDocument/2006/relationships" xmlns:p="http://schemas.openxmlformats.org/presentationml/2006/main">
   <p:cSld>
@@ -2274,7 +2281,7 @@
       <p:grpSpPr/>
       <p:sp>
         <p:nvSpPr>
-          <p:cNvPr id="5" name="Title 4"/>
+          <p:cNvPr id="10" name="Title 9"/>
           <p:cNvSpPr>
             <a:spLocks noGrp="1"/>
           </p:cNvSpPr>
@@ -2288,7 +2295,7 @@
           <a:p>
             <a:r>
               <a:rPr lang="en-US"/>
-              <a:t>Kibana</a:t>
+              <a:t>Logstash</a:t>
             </a:r>
             <a:endParaRPr lang="en-US"/>
           </a:p>
@@ -2296,7 +2303,7 @@
       </p:sp>
       <p:sp>
         <p:nvSpPr>
-          <p:cNvPr id="6" name="Content Placeholder 5"/>
+          <p:cNvPr id="11" name="Content Placeholder 10"/>
           <p:cNvSpPr>
             <a:spLocks noGrp="1"/>
           </p:cNvSpPr>
@@ -2306,8 +2313,8 @@
         </p:nvSpPr>
         <p:spPr>
           <a:xfrm>
-            <a:off x="838200" y="1776730"/>
-            <a:ext cx="5885815" cy="4395470"/>
+            <a:off x="412115" y="1649095"/>
+            <a:ext cx="5830570" cy="4395470"/>
           </a:xfrm>
         </p:spPr>
         <p:txBody>
@@ -2315,12 +2322,38 @@
           <a:p>
             <a:r>
               <a:rPr lang="en-US" sz="2800"/>
-              <a:t>Display data using chart</a:t>
+              <a:t>Parse log line into readable format</a:t>
             </a:r>
             <a:endParaRPr lang="en-US" sz="2800"/>
           </a:p>
         </p:txBody>
       </p:sp>
+      <p:pic>
+        <p:nvPicPr>
+          <p:cNvPr id="7" name="Picture Placeholder 6"/>
+          <p:cNvPicPr>
+            <a:picLocks noChangeAspect="1"/>
+          </p:cNvPicPr>
+          <p:nvPr>
+            <p:ph type="pic" sz="quarter" idx="12"/>
+          </p:nvPr>
+        </p:nvPicPr>
+        <p:blipFill>
+          <a:blip r:embed="rId1"/>
+          <a:stretch>
+            <a:fillRect/>
+          </a:stretch>
+        </p:blipFill>
+        <p:spPr>
+          <a:xfrm>
+            <a:off x="4569460" y="2557145"/>
+            <a:ext cx="7010400" cy="2834640"/>
+          </a:xfrm>
+          <a:prstGeom prst="rect">
+            <a:avLst/>
+          </a:prstGeom>
+        </p:spPr>
+      </p:pic>
     </p:spTree>
   </p:cSld>
   <p:clrMapOvr>
@@ -2330,6 +2363,174 @@
 </file>
 
 <file path=ppt/slides/slide7.xml><?xml version="1.0" encoding="utf-8"?>
+<p:sld xmlns:a="http://schemas.openxmlformats.org/drawingml/2006/main" xmlns:r="http://schemas.openxmlformats.org/officeDocument/2006/relationships" xmlns:p="http://schemas.openxmlformats.org/presentationml/2006/main">
+  <p:cSld>
+    <p:spTree>
+      <p:nvGrpSpPr>
+        <p:cNvPr id="1" name=""/>
+        <p:cNvGrpSpPr/>
+        <p:nvPr/>
+      </p:nvGrpSpPr>
+      <p:grpSpPr/>
+      <p:sp>
+        <p:nvSpPr>
+          <p:cNvPr id="10" name="Title 9"/>
+          <p:cNvSpPr>
+            <a:spLocks noGrp="1"/>
+          </p:cNvSpPr>
+          <p:nvPr>
+            <p:ph type="ctrTitle"/>
+          </p:nvPr>
+        </p:nvSpPr>
+        <p:spPr/>
+        <p:txBody>
+          <a:bodyPr/>
+          <a:p>
+            <a:r>
+              <a:rPr lang="en-US"/>
+              <a:t>Elasticsearch</a:t>
+            </a:r>
+            <a:endParaRPr lang="en-US"/>
+          </a:p>
+        </p:txBody>
+      </p:sp>
+      <p:sp>
+        <p:nvSpPr>
+          <p:cNvPr id="11" name="Content Placeholder 10"/>
+          <p:cNvSpPr>
+            <a:spLocks noGrp="1"/>
+          </p:cNvSpPr>
+          <p:nvPr>
+            <p:ph sz="quarter" idx="11"/>
+          </p:nvPr>
+        </p:nvSpPr>
+        <p:spPr>
+          <a:xfrm>
+            <a:off x="428625" y="1568450"/>
+            <a:ext cx="5860415" cy="4395470"/>
+          </a:xfrm>
+        </p:spPr>
+        <p:txBody>
+          <a:bodyPr/>
+          <a:p>
+            <a:r>
+              <a:rPr lang="en-US" sz="2800"/>
+              <a:t>Store logs</a:t>
+            </a:r>
+            <a:endParaRPr lang="en-US" sz="2800"/>
+          </a:p>
+          <a:p>
+            <a:r>
+              <a:rPr lang="en-US" sz="2800"/>
+              <a:t>Act as a datasource for Kibana</a:t>
+            </a:r>
+            <a:endParaRPr lang="en-US" sz="2800"/>
+          </a:p>
+        </p:txBody>
+      </p:sp>
+    </p:spTree>
+  </p:cSld>
+  <p:clrMapOvr>
+    <a:masterClrMapping/>
+  </p:clrMapOvr>
+</p:sld>
+</file>
+
+<file path=ppt/slides/slide8.xml><?xml version="1.0" encoding="utf-8"?>
+<p:sld xmlns:a="http://schemas.openxmlformats.org/drawingml/2006/main" xmlns:r="http://schemas.openxmlformats.org/officeDocument/2006/relationships" xmlns:p="http://schemas.openxmlformats.org/presentationml/2006/main">
+  <p:cSld>
+    <p:spTree>
+      <p:nvGrpSpPr>
+        <p:cNvPr id="1" name=""/>
+        <p:cNvGrpSpPr/>
+        <p:nvPr/>
+      </p:nvGrpSpPr>
+      <p:grpSpPr/>
+      <p:sp>
+        <p:nvSpPr>
+          <p:cNvPr id="5" name="Title 4"/>
+          <p:cNvSpPr>
+            <a:spLocks noGrp="1"/>
+          </p:cNvSpPr>
+          <p:nvPr>
+            <p:ph type="ctrTitle"/>
+          </p:nvPr>
+        </p:nvSpPr>
+        <p:spPr/>
+        <p:txBody>
+          <a:bodyPr/>
+          <a:p>
+            <a:r>
+              <a:rPr lang="en-US"/>
+              <a:t>Kibana</a:t>
+            </a:r>
+            <a:endParaRPr lang="en-US"/>
+          </a:p>
+        </p:txBody>
+      </p:sp>
+      <p:sp>
+        <p:nvSpPr>
+          <p:cNvPr id="6" name="Content Placeholder 5"/>
+          <p:cNvSpPr>
+            <a:spLocks noGrp="1"/>
+          </p:cNvSpPr>
+          <p:nvPr>
+            <p:ph sz="quarter" idx="11"/>
+          </p:nvPr>
+        </p:nvSpPr>
+        <p:spPr>
+          <a:xfrm>
+            <a:off x="375285" y="1527224"/>
+            <a:ext cx="4114800" cy="4395421"/>
+          </a:xfrm>
+        </p:spPr>
+        <p:txBody>
+          <a:bodyPr/>
+          <a:p>
+            <a:r>
+              <a:rPr lang="en-US" sz="2800"/>
+              <a:t>Display data using chart</a:t>
+            </a:r>
+            <a:endParaRPr lang="en-US" sz="2800"/>
+          </a:p>
+        </p:txBody>
+      </p:sp>
+      <p:pic>
+        <p:nvPicPr>
+          <p:cNvPr id="7" name="Picture Placeholder 6" descr="C:\Users\lvthang\Desktop\New folder\es-apm-dashboard-request.pnges-apm-dashboard-request"/>
+          <p:cNvPicPr>
+            <a:picLocks noChangeAspect="1"/>
+          </p:cNvPicPr>
+          <p:nvPr>
+            <p:ph type="pic" sz="quarter" idx="12"/>
+          </p:nvPr>
+        </p:nvPicPr>
+        <p:blipFill>
+          <a:blip r:embed="rId1"/>
+          <a:srcRect/>
+          <a:stretch>
+            <a:fillRect/>
+          </a:stretch>
+        </p:blipFill>
+        <p:spPr>
+          <a:xfrm>
+            <a:off x="4082415" y="2391410"/>
+            <a:ext cx="7762875" cy="3877310"/>
+          </a:xfrm>
+          <a:prstGeom prst="rect">
+            <a:avLst/>
+          </a:prstGeom>
+        </p:spPr>
+      </p:pic>
+    </p:spTree>
+  </p:cSld>
+  <p:clrMapOvr>
+    <a:masterClrMapping/>
+  </p:clrMapOvr>
+</p:sld>
+</file>
+
+<file path=ppt/slides/slide9.xml><?xml version="1.0" encoding="utf-8"?>
 <p:sld xmlns:a="http://schemas.openxmlformats.org/drawingml/2006/main" xmlns:r="http://schemas.openxmlformats.org/officeDocument/2006/relationships" xmlns:p="http://schemas.openxmlformats.org/presentationml/2006/main">
   <p:cSld>
     <p:spTree>

</xml_diff>